<commit_message>
Near final draft now
</commit_message>
<xml_diff>
--- a/analysis_comps/plots/ConversionDiagrams.pptx
+++ b/analysis_comps/plots/ConversionDiagrams.pptx
@@ -5,7 +5,8 @@
     <p:sldMasterId id="2147483648" r:id="rId1"/>
   </p:sldMasterIdLst>
   <p:sldIdLst>
-    <p:sldId id="257" r:id="rId2"/>
+    <p:sldId id="260" r:id="rId2"/>
+    <p:sldId id="259" r:id="rId3"/>
   </p:sldIdLst>
   <p:sldSz cx="9144000" cy="6858000" type="screen4x3"/>
   <p:notesSz cx="6858000" cy="9144000"/>
@@ -288,7 +289,7 @@
           <a:p>
             <a:fld id="{12ED5304-5E4B-7646-929A-47ABD6A68139}" type="datetimeFigureOut">
               <a:rPr lang="en-US" smtClean="0"/>
-              <a:t>18/12/2013</a:t>
+              <a:t>21/03/2014</a:t>
             </a:fld>
             <a:endParaRPr lang="en-GB"/>
           </a:p>
@@ -458,7 +459,7 @@
           <a:p>
             <a:fld id="{12ED5304-5E4B-7646-929A-47ABD6A68139}" type="datetimeFigureOut">
               <a:rPr lang="en-US" smtClean="0"/>
-              <a:t>18/12/2013</a:t>
+              <a:t>21/03/2014</a:t>
             </a:fld>
             <a:endParaRPr lang="en-GB"/>
           </a:p>
@@ -638,7 +639,7 @@
           <a:p>
             <a:fld id="{12ED5304-5E4B-7646-929A-47ABD6A68139}" type="datetimeFigureOut">
               <a:rPr lang="en-US" smtClean="0"/>
-              <a:t>18/12/2013</a:t>
+              <a:t>21/03/2014</a:t>
             </a:fld>
             <a:endParaRPr lang="en-GB"/>
           </a:p>
@@ -808,7 +809,7 @@
           <a:p>
             <a:fld id="{12ED5304-5E4B-7646-929A-47ABD6A68139}" type="datetimeFigureOut">
               <a:rPr lang="en-US" smtClean="0"/>
-              <a:t>18/12/2013</a:t>
+              <a:t>21/03/2014</a:t>
             </a:fld>
             <a:endParaRPr lang="en-GB"/>
           </a:p>
@@ -1054,7 +1055,7 @@
           <a:p>
             <a:fld id="{12ED5304-5E4B-7646-929A-47ABD6A68139}" type="datetimeFigureOut">
               <a:rPr lang="en-US" smtClean="0"/>
-              <a:t>18/12/2013</a:t>
+              <a:t>21/03/2014</a:t>
             </a:fld>
             <a:endParaRPr lang="en-GB"/>
           </a:p>
@@ -1342,7 +1343,7 @@
           <a:p>
             <a:fld id="{12ED5304-5E4B-7646-929A-47ABD6A68139}" type="datetimeFigureOut">
               <a:rPr lang="en-US" smtClean="0"/>
-              <a:t>18/12/2013</a:t>
+              <a:t>21/03/2014</a:t>
             </a:fld>
             <a:endParaRPr lang="en-GB"/>
           </a:p>
@@ -1764,7 +1765,7 @@
           <a:p>
             <a:fld id="{12ED5304-5E4B-7646-929A-47ABD6A68139}" type="datetimeFigureOut">
               <a:rPr lang="en-US" smtClean="0"/>
-              <a:t>18/12/2013</a:t>
+              <a:t>21/03/2014</a:t>
             </a:fld>
             <a:endParaRPr lang="en-GB"/>
           </a:p>
@@ -1882,7 +1883,7 @@
           <a:p>
             <a:fld id="{12ED5304-5E4B-7646-929A-47ABD6A68139}" type="datetimeFigureOut">
               <a:rPr lang="en-US" smtClean="0"/>
-              <a:t>18/12/2013</a:t>
+              <a:t>21/03/2014</a:t>
             </a:fld>
             <a:endParaRPr lang="en-GB"/>
           </a:p>
@@ -1977,7 +1978,7 @@
           <a:p>
             <a:fld id="{12ED5304-5E4B-7646-929A-47ABD6A68139}" type="datetimeFigureOut">
               <a:rPr lang="en-US" smtClean="0"/>
-              <a:t>18/12/2013</a:t>
+              <a:t>21/03/2014</a:t>
             </a:fld>
             <a:endParaRPr lang="en-GB"/>
           </a:p>
@@ -2254,7 +2255,7 @@
           <a:p>
             <a:fld id="{12ED5304-5E4B-7646-929A-47ABD6A68139}" type="datetimeFigureOut">
               <a:rPr lang="en-US" smtClean="0"/>
-              <a:t>18/12/2013</a:t>
+              <a:t>21/03/2014</a:t>
             </a:fld>
             <a:endParaRPr lang="en-GB"/>
           </a:p>
@@ -2507,7 +2508,7 @@
           <a:p>
             <a:fld id="{12ED5304-5E4B-7646-929A-47ABD6A68139}" type="datetimeFigureOut">
               <a:rPr lang="en-US" smtClean="0"/>
-              <a:t>18/12/2013</a:t>
+              <a:t>21/03/2014</a:t>
             </a:fld>
             <a:endParaRPr lang="en-GB"/>
           </a:p>
@@ -2720,7 +2721,7 @@
           <a:p>
             <a:fld id="{12ED5304-5E4B-7646-929A-47ABD6A68139}" type="datetimeFigureOut">
               <a:rPr lang="en-US" smtClean="0"/>
-              <a:t>18/12/2013</a:t>
+              <a:t>21/03/2014</a:t>
             </a:fld>
             <a:endParaRPr lang="en-GB"/>
           </a:p>
@@ -3097,6 +3098,40 @@
       </p:grpSpPr>
       <p:sp>
         <p:nvSpPr>
+          <p:cNvPr id="29" name="TextBox 28"/>
+          <p:cNvSpPr txBox="1"/>
+          <p:nvPr/>
+        </p:nvSpPr>
+        <p:spPr>
+          <a:xfrm>
+            <a:off x="1258975" y="5647461"/>
+            <a:ext cx="2471071" cy="461665"/>
+          </a:xfrm>
+          <a:prstGeom prst="rect">
+            <a:avLst/>
+          </a:prstGeom>
+          <a:noFill/>
+        </p:spPr>
+        <p:txBody>
+          <a:bodyPr wrap="square" rtlCol="0">
+            <a:spAutoFit/>
+          </a:bodyPr>
+          <a:lstStyle/>
+          <a:p>
+            <a:r>
+              <a:rPr lang="en-GB" sz="2400" i="1" dirty="0" smtClean="0"/>
+              <a:t>z</a:t>
+            </a:r>
+            <a:r>
+              <a:rPr lang="en-GB" sz="2400" dirty="0" smtClean="0"/>
+              <a:t>-axis</a:t>
+            </a:r>
+            <a:endParaRPr lang="en-GB" sz="2400" dirty="0"/>
+          </a:p>
+        </p:txBody>
+      </p:sp>
+      <p:sp>
+        <p:nvSpPr>
           <p:cNvPr id="4" name="TextBox 3"/>
           <p:cNvSpPr txBox="1"/>
           <p:nvPr/>
@@ -3119,7 +3154,7 @@
           <a:p>
             <a:r>
               <a:rPr lang="en-GB" sz="2800" b="1" u="sng" dirty="0" smtClean="0"/>
-              <a:t>Case 2</a:t>
+              <a:t>Case 1</a:t>
             </a:r>
             <a:endParaRPr lang="en-GB" sz="2800" b="1" u="sng" dirty="0"/>
           </a:p>
@@ -3530,7 +3565,7 @@
         </p:nvSpPr>
         <p:spPr>
           <a:xfrm>
-            <a:off x="3259041" y="2176703"/>
+            <a:off x="4005050" y="3624006"/>
             <a:ext cx="303707" cy="317532"/>
           </a:xfrm>
           <a:prstGeom prst="ellipse">
@@ -3577,8 +3612,8 @@
         </p:nvSpPr>
         <p:spPr>
           <a:xfrm>
-            <a:off x="2553901" y="1671568"/>
-            <a:ext cx="1008847" cy="109908"/>
+            <a:off x="2553901" y="1671567"/>
+            <a:ext cx="1356154" cy="109909"/>
           </a:xfrm>
           <a:prstGeom prst="ellipse">
             <a:avLst/>
@@ -3675,7 +3710,7 @@
         </p:nvSpPr>
         <p:spPr>
           <a:xfrm>
-            <a:off x="3605802" y="2263402"/>
+            <a:off x="4308757" y="3624006"/>
             <a:ext cx="2649442" cy="461665"/>
           </a:xfrm>
           <a:prstGeom prst="rect">
@@ -3724,10 +3759,6 @@
               <a:rPr lang="en-GB" sz="2400" dirty="0" err="1" smtClean="0"/>
               <a:t>Supercluster</a:t>
             </a:r>
-            <a:r>
-              <a:rPr lang="en-GB" sz="2400" dirty="0" smtClean="0"/>
-              <a:t> position</a:t>
-            </a:r>
             <a:endParaRPr lang="en-GB" sz="2400" dirty="0"/>
           </a:p>
         </p:txBody>
@@ -3760,53 +3791,6 @@
               <a:t>ECAL face</a:t>
             </a:r>
             <a:endParaRPr lang="en-GB" sz="2400" dirty="0"/>
-          </a:p>
-        </p:txBody>
-      </p:sp>
-      <p:sp>
-        <p:nvSpPr>
-          <p:cNvPr id="40" name="Oval 39"/>
-          <p:cNvSpPr/>
-          <p:nvPr/>
-        </p:nvSpPr>
-        <p:spPr>
-          <a:xfrm>
-            <a:off x="3038165" y="1698640"/>
-            <a:ext cx="152400" cy="172571"/>
-          </a:xfrm>
-          <a:prstGeom prst="ellipse">
-            <a:avLst/>
-          </a:prstGeom>
-          <a:solidFill>
-            <a:schemeClr val="tx1"/>
-          </a:solidFill>
-          <a:ln>
-            <a:solidFill>
-              <a:schemeClr val="tx1"/>
-            </a:solidFill>
-          </a:ln>
-          <a:effectLst/>
-        </p:spPr>
-        <p:style>
-          <a:lnRef idx="1">
-            <a:schemeClr val="accent1"/>
-          </a:lnRef>
-          <a:fillRef idx="3">
-            <a:schemeClr val="accent1"/>
-          </a:fillRef>
-          <a:effectRef idx="2">
-            <a:schemeClr val="accent1"/>
-          </a:effectRef>
-          <a:fontRef idx="minor">
-            <a:schemeClr val="lt1"/>
-          </a:fontRef>
-        </p:style>
-        <p:txBody>
-          <a:bodyPr rtlCol="0" anchor="ctr"/>
-          <a:lstStyle/>
-          <a:p>
-            <a:pPr algn="ctr"/>
-            <a:endParaRPr lang="en-GB"/>
           </a:p>
         </p:txBody>
       </p:sp>
@@ -3910,8 +3894,8 @@
         </p:nvCxnSpPr>
         <p:spPr>
           <a:xfrm>
-            <a:off x="3107734" y="1781476"/>
-            <a:ext cx="2014419" cy="3823653"/>
+            <a:off x="4156904" y="3782772"/>
+            <a:ext cx="965249" cy="1822357"/>
           </a:xfrm>
           <a:prstGeom prst="line">
             <a:avLst/>
@@ -3946,9 +3930,9 @@
           <p:nvPr/>
         </p:nvCxnSpPr>
         <p:spPr>
-          <a:xfrm flipV="1">
-            <a:off x="3438505" y="1781476"/>
-            <a:ext cx="0" cy="579305"/>
+          <a:xfrm flipH="1" flipV="1">
+            <a:off x="3730046" y="1781477"/>
+            <a:ext cx="426859" cy="2001296"/>
           </a:xfrm>
           <a:prstGeom prst="line">
             <a:avLst/>
@@ -3983,8 +3967,8 @@
         </p:nvCxnSpPr>
         <p:spPr>
           <a:xfrm flipH="1" flipV="1">
-            <a:off x="2664340" y="1781476"/>
-            <a:ext cx="774165" cy="616657"/>
+            <a:off x="2664341" y="1781477"/>
+            <a:ext cx="1492563" cy="2001295"/>
           </a:xfrm>
           <a:prstGeom prst="line">
             <a:avLst/>
@@ -4050,6 +4034,1362 @@
       </p:cxnSp>
       <p:sp>
         <p:nvSpPr>
+          <p:cNvPr id="27" name="Freeform 26"/>
+          <p:cNvSpPr/>
+          <p:nvPr/>
+        </p:nvSpPr>
+        <p:spPr>
+          <a:xfrm>
+            <a:off x="3313169" y="2208918"/>
+            <a:ext cx="524585" cy="427978"/>
+          </a:xfrm>
+          <a:custGeom>
+            <a:avLst/>
+            <a:gdLst>
+              <a:gd name="connsiteX0" fmla="*/ 0 w 455561"/>
+              <a:gd name="connsiteY0" fmla="*/ 510812 h 510812"/>
+              <a:gd name="connsiteX1" fmla="*/ 96634 w 455561"/>
+              <a:gd name="connsiteY1" fmla="*/ 124252 h 510812"/>
+              <a:gd name="connsiteX2" fmla="*/ 455561 w 455561"/>
+              <a:gd name="connsiteY2" fmla="*/ 0 h 510812"/>
+              <a:gd name="connsiteX0" fmla="*/ 0 w 524585"/>
+              <a:gd name="connsiteY0" fmla="*/ 427978 h 427978"/>
+              <a:gd name="connsiteX1" fmla="*/ 165658 w 524585"/>
+              <a:gd name="connsiteY1" fmla="*/ 124252 h 427978"/>
+              <a:gd name="connsiteX2" fmla="*/ 524585 w 524585"/>
+              <a:gd name="connsiteY2" fmla="*/ 0 h 427978"/>
+            </a:gdLst>
+            <a:ahLst/>
+            <a:cxnLst>
+              <a:cxn ang="0">
+                <a:pos x="connsiteX0" y="connsiteY0"/>
+              </a:cxn>
+              <a:cxn ang="0">
+                <a:pos x="connsiteX1" y="connsiteY1"/>
+              </a:cxn>
+              <a:cxn ang="0">
+                <a:pos x="connsiteX2" y="connsiteY2"/>
+              </a:cxn>
+            </a:cxnLst>
+            <a:rect l="l" t="t" r="r" b="b"/>
+            <a:pathLst>
+              <a:path w="524585" h="427978">
+                <a:moveTo>
+                  <a:pt x="0" y="427978"/>
+                </a:moveTo>
+                <a:cubicBezTo>
+                  <a:pt x="10353" y="277265"/>
+                  <a:pt x="78227" y="195582"/>
+                  <a:pt x="165658" y="124252"/>
+                </a:cubicBezTo>
+                <a:cubicBezTo>
+                  <a:pt x="253089" y="52922"/>
+                  <a:pt x="383085" y="19558"/>
+                  <a:pt x="524585" y="0"/>
+                </a:cubicBezTo>
+              </a:path>
+            </a:pathLst>
+          </a:custGeom>
+          <a:ln>
+            <a:solidFill>
+              <a:schemeClr val="tx1"/>
+            </a:solidFill>
+          </a:ln>
+          <a:effectLst/>
+        </p:spPr>
+        <p:style>
+          <a:lnRef idx="2">
+            <a:schemeClr val="accent1"/>
+          </a:lnRef>
+          <a:fillRef idx="0">
+            <a:schemeClr val="accent1"/>
+          </a:fillRef>
+          <a:effectRef idx="1">
+            <a:schemeClr val="accent1"/>
+          </a:effectRef>
+          <a:fontRef idx="minor">
+            <a:schemeClr val="tx1"/>
+          </a:fontRef>
+        </p:style>
+        <p:txBody>
+          <a:bodyPr rtlCol="0" anchor="ctr"/>
+          <a:lstStyle/>
+          <a:p>
+            <a:pPr algn="ctr"/>
+            <a:endParaRPr lang="en-GB" dirty="0"/>
+          </a:p>
+        </p:txBody>
+      </p:sp>
+      <p:cxnSp>
+        <p:nvCxnSpPr>
+          <p:cNvPr id="22" name="Straight Arrow Connector 21"/>
+          <p:cNvCxnSpPr/>
+          <p:nvPr/>
+        </p:nvCxnSpPr>
+        <p:spPr>
+          <a:xfrm flipH="1" flipV="1">
+            <a:off x="3730046" y="2913011"/>
+            <a:ext cx="426860" cy="869762"/>
+          </a:xfrm>
+          <a:prstGeom prst="straightConnector1">
+            <a:avLst/>
+          </a:prstGeom>
+          <a:ln w="47625" cmpd="sng">
+            <a:solidFill>
+              <a:srgbClr val="FF0000"/>
+            </a:solidFill>
+            <a:headEnd type="none"/>
+            <a:tailEnd type="triangle"/>
+          </a:ln>
+          <a:effectLst/>
+        </p:spPr>
+        <p:style>
+          <a:lnRef idx="2">
+            <a:schemeClr val="accent1"/>
+          </a:lnRef>
+          <a:fillRef idx="0">
+            <a:schemeClr val="accent1"/>
+          </a:fillRef>
+          <a:effectRef idx="1">
+            <a:schemeClr val="accent1"/>
+          </a:effectRef>
+          <a:fontRef idx="minor">
+            <a:schemeClr val="tx1"/>
+          </a:fontRef>
+        </p:style>
+      </p:cxnSp>
+      <p:sp>
+        <p:nvSpPr>
+          <p:cNvPr id="42" name="TextBox 41"/>
+          <p:cNvSpPr txBox="1"/>
+          <p:nvPr/>
+        </p:nvSpPr>
+        <p:spPr>
+          <a:xfrm>
+            <a:off x="4019400" y="3041127"/>
+            <a:ext cx="3421968" cy="461665"/>
+          </a:xfrm>
+          <a:prstGeom prst="rect">
+            <a:avLst/>
+          </a:prstGeom>
+          <a:noFill/>
+        </p:spPr>
+        <p:txBody>
+          <a:bodyPr wrap="square" rtlCol="0">
+            <a:spAutoFit/>
+          </a:bodyPr>
+          <a:lstStyle/>
+          <a:p>
+            <a:r>
+              <a:rPr lang="en-GB" sz="2400" dirty="0" smtClean="0"/>
+              <a:t>Conversion momentum</a:t>
+            </a:r>
+            <a:endParaRPr lang="en-GB" sz="2400" dirty="0"/>
+          </a:p>
+        </p:txBody>
+      </p:sp>
+      <p:sp>
+        <p:nvSpPr>
+          <p:cNvPr id="28" name="TextBox 27"/>
+          <p:cNvSpPr txBox="1"/>
+          <p:nvPr/>
+        </p:nvSpPr>
+        <p:spPr>
+          <a:xfrm>
+            <a:off x="3412402" y="2172714"/>
+            <a:ext cx="564359" cy="523220"/>
+          </a:xfrm>
+          <a:prstGeom prst="rect">
+            <a:avLst/>
+          </a:prstGeom>
+          <a:noFill/>
+        </p:spPr>
+        <p:txBody>
+          <a:bodyPr wrap="square" rtlCol="0">
+            <a:spAutoFit/>
+          </a:bodyPr>
+          <a:lstStyle/>
+          <a:p>
+            <a:r>
+              <a:rPr lang="en-GB" sz="2800" i="1" dirty="0" err="1" smtClean="0"/>
+              <a:t>ϕ</a:t>
+            </a:r>
+            <a:endParaRPr lang="en-GB" sz="2800" i="1" dirty="0"/>
+          </a:p>
+        </p:txBody>
+      </p:sp>
+      <p:sp>
+        <p:nvSpPr>
+          <p:cNvPr id="30" name="TextBox 29"/>
+          <p:cNvSpPr txBox="1"/>
+          <p:nvPr/>
+        </p:nvSpPr>
+        <p:spPr>
+          <a:xfrm>
+            <a:off x="3882446" y="2203983"/>
+            <a:ext cx="1791356" cy="523220"/>
+          </a:xfrm>
+          <a:prstGeom prst="rect">
+            <a:avLst/>
+          </a:prstGeom>
+          <a:noFill/>
+        </p:spPr>
+        <p:txBody>
+          <a:bodyPr wrap="square" rtlCol="0">
+            <a:spAutoFit/>
+          </a:bodyPr>
+          <a:lstStyle/>
+          <a:p>
+            <a:r>
+              <a:rPr lang="en-GB" sz="1400" dirty="0" smtClean="0"/>
+              <a:t>Electrons separate in </a:t>
+            </a:r>
+            <a:r>
+              <a:rPr lang="en-GB" sz="1400" i="1" dirty="0" err="1" smtClean="0"/>
+              <a:t>ϕ</a:t>
+            </a:r>
+            <a:r>
+              <a:rPr lang="en-GB" sz="1400" dirty="0" smtClean="0"/>
+              <a:t> only to first order</a:t>
+            </a:r>
+            <a:endParaRPr lang="en-GB" sz="1400" dirty="0"/>
+          </a:p>
+        </p:txBody>
+      </p:sp>
+      <p:grpSp>
+        <p:nvGrpSpPr>
+          <p:cNvPr id="21" name="Group 20"/>
+          <p:cNvGrpSpPr/>
+          <p:nvPr/>
+        </p:nvGrpSpPr>
+        <p:grpSpPr>
+          <a:xfrm>
+            <a:off x="1214828" y="3925393"/>
+            <a:ext cx="1131082" cy="839641"/>
+            <a:chOff x="1214828" y="3925393"/>
+            <a:chExt cx="1131082" cy="839641"/>
+          </a:xfrm>
+        </p:grpSpPr>
+        <p:cxnSp>
+          <p:nvCxnSpPr>
+            <p:cNvPr id="37" name="Straight Arrow Connector 36"/>
+            <p:cNvCxnSpPr/>
+            <p:nvPr/>
+          </p:nvCxnSpPr>
+          <p:spPr>
+            <a:xfrm>
+              <a:off x="1214828" y="4576535"/>
+              <a:ext cx="704049" cy="0"/>
+            </a:xfrm>
+            <a:prstGeom prst="straightConnector1">
+              <a:avLst/>
+            </a:prstGeom>
+            <a:ln w="28575" cmpd="sng">
+              <a:solidFill>
+                <a:schemeClr val="tx1"/>
+              </a:solidFill>
+              <a:tailEnd type="arrow"/>
+            </a:ln>
+            <a:effectLst/>
+          </p:spPr>
+          <p:style>
+            <a:lnRef idx="2">
+              <a:schemeClr val="accent1"/>
+            </a:lnRef>
+            <a:fillRef idx="0">
+              <a:schemeClr val="accent1"/>
+            </a:fillRef>
+            <a:effectRef idx="1">
+              <a:schemeClr val="accent1"/>
+            </a:effectRef>
+            <a:fontRef idx="minor">
+              <a:schemeClr val="tx1"/>
+            </a:fontRef>
+          </p:style>
+        </p:cxnSp>
+        <p:cxnSp>
+          <p:nvCxnSpPr>
+            <p:cNvPr id="40" name="Straight Arrow Connector 39"/>
+            <p:cNvCxnSpPr/>
+            <p:nvPr/>
+          </p:nvCxnSpPr>
+          <p:spPr>
+            <a:xfrm flipV="1">
+              <a:off x="1214828" y="4289778"/>
+              <a:ext cx="540301" cy="286757"/>
+            </a:xfrm>
+            <a:prstGeom prst="straightConnector1">
+              <a:avLst/>
+            </a:prstGeom>
+            <a:ln w="28575" cmpd="sng">
+              <a:solidFill>
+                <a:schemeClr val="tx1"/>
+              </a:solidFill>
+              <a:tailEnd type="arrow"/>
+            </a:ln>
+            <a:effectLst/>
+          </p:spPr>
+          <p:style>
+            <a:lnRef idx="2">
+              <a:schemeClr val="accent1"/>
+            </a:lnRef>
+            <a:fillRef idx="0">
+              <a:schemeClr val="accent1"/>
+            </a:fillRef>
+            <a:effectRef idx="1">
+              <a:schemeClr val="accent1"/>
+            </a:effectRef>
+            <a:fontRef idx="minor">
+              <a:schemeClr val="tx1"/>
+            </a:fontRef>
+          </p:style>
+        </p:cxnSp>
+        <p:sp>
+          <p:nvSpPr>
+            <p:cNvPr id="20" name="TextBox 19"/>
+            <p:cNvSpPr txBox="1"/>
+            <p:nvPr/>
+          </p:nvSpPr>
+          <p:spPr>
+            <a:xfrm>
+              <a:off x="1876544" y="4303369"/>
+              <a:ext cx="469366" cy="461665"/>
+            </a:xfrm>
+            <a:prstGeom prst="rect">
+              <a:avLst/>
+            </a:prstGeom>
+            <a:noFill/>
+          </p:spPr>
+          <p:txBody>
+            <a:bodyPr wrap="square" rtlCol="0">
+              <a:spAutoFit/>
+            </a:bodyPr>
+            <a:lstStyle/>
+            <a:p>
+              <a:r>
+                <a:rPr lang="en-GB" sz="2400" i="1" dirty="0" err="1" smtClean="0"/>
+                <a:t>η</a:t>
+              </a:r>
+              <a:endParaRPr lang="en-GB" sz="2400" i="1" dirty="0"/>
+            </a:p>
+          </p:txBody>
+        </p:sp>
+        <p:sp>
+          <p:nvSpPr>
+            <p:cNvPr id="43" name="TextBox 42"/>
+            <p:cNvSpPr txBox="1"/>
+            <p:nvPr/>
+          </p:nvSpPr>
+          <p:spPr>
+            <a:xfrm>
+              <a:off x="1684194" y="3925393"/>
+              <a:ext cx="469366" cy="461665"/>
+            </a:xfrm>
+            <a:prstGeom prst="rect">
+              <a:avLst/>
+            </a:prstGeom>
+            <a:noFill/>
+          </p:spPr>
+          <p:txBody>
+            <a:bodyPr wrap="square" rtlCol="0">
+              <a:spAutoFit/>
+            </a:bodyPr>
+            <a:lstStyle/>
+            <a:p>
+              <a:r>
+                <a:rPr lang="en-GB" sz="2400" i="1" dirty="0" err="1" smtClean="0"/>
+                <a:t>ϕ</a:t>
+              </a:r>
+              <a:endParaRPr lang="en-GB" sz="2400" i="1" dirty="0"/>
+            </a:p>
+          </p:txBody>
+        </p:sp>
+      </p:grpSp>
+    </p:spTree>
+    <p:extLst>
+      <p:ext uri="{BB962C8B-B14F-4D97-AF65-F5344CB8AC3E}">
+        <p14:creationId xmlns:p14="http://schemas.microsoft.com/office/powerpoint/2010/main" val="3902680894"/>
+      </p:ext>
+    </p:extLst>
+  </p:cSld>
+  <p:clrMapOvr>
+    <a:masterClrMapping/>
+  </p:clrMapOvr>
+</p:sld>
+</file>
+
+<file path=ppt/slides/slide2.xml><?xml version="1.0" encoding="utf-8"?>
+<p:sld xmlns:a="http://schemas.openxmlformats.org/drawingml/2006/main" xmlns:r="http://schemas.openxmlformats.org/officeDocument/2006/relationships" xmlns:p="http://schemas.openxmlformats.org/presentationml/2006/main">
+  <p:cSld>
+    <p:spTree>
+      <p:nvGrpSpPr>
+        <p:cNvPr id="1" name=""/>
+        <p:cNvGrpSpPr/>
+        <p:nvPr/>
+      </p:nvGrpSpPr>
+      <p:grpSpPr>
+        <a:xfrm>
+          <a:off x="0" y="0"/>
+          <a:ext cx="0" cy="0"/>
+          <a:chOff x="0" y="0"/>
+          <a:chExt cx="0" cy="0"/>
+        </a:xfrm>
+      </p:grpSpPr>
+      <p:sp>
+        <p:nvSpPr>
+          <p:cNvPr id="4" name="TextBox 3"/>
+          <p:cNvSpPr txBox="1"/>
+          <p:nvPr/>
+        </p:nvSpPr>
+        <p:spPr>
+          <a:xfrm>
+            <a:off x="414146" y="455589"/>
+            <a:ext cx="1504731" cy="523220"/>
+          </a:xfrm>
+          <a:prstGeom prst="rect">
+            <a:avLst/>
+          </a:prstGeom>
+          <a:noFill/>
+        </p:spPr>
+        <p:txBody>
+          <a:bodyPr wrap="square" rtlCol="0">
+            <a:spAutoFit/>
+          </a:bodyPr>
+          <a:lstStyle/>
+          <a:p>
+            <a:r>
+              <a:rPr lang="en-GB" sz="2800" b="1" u="sng" dirty="0" smtClean="0"/>
+              <a:t>Case 2</a:t>
+            </a:r>
+            <a:endParaRPr lang="en-GB" sz="2800" b="1" u="sng" dirty="0"/>
+          </a:p>
+        </p:txBody>
+      </p:sp>
+      <p:cxnSp>
+        <p:nvCxnSpPr>
+          <p:cNvPr id="6" name="Straight Connector 5"/>
+          <p:cNvCxnSpPr/>
+          <p:nvPr/>
+        </p:nvCxnSpPr>
+        <p:spPr>
+          <a:xfrm flipV="1">
+            <a:off x="1214828" y="5605129"/>
+            <a:ext cx="6515899" cy="1"/>
+          </a:xfrm>
+          <a:prstGeom prst="line">
+            <a:avLst/>
+          </a:prstGeom>
+          <a:ln w="28575" cmpd="sng">
+            <a:solidFill>
+              <a:schemeClr val="tx1"/>
+            </a:solidFill>
+            <a:prstDash val="dash"/>
+          </a:ln>
+          <a:effectLst/>
+        </p:spPr>
+        <p:style>
+          <a:lnRef idx="2">
+            <a:schemeClr val="accent1"/>
+          </a:lnRef>
+          <a:fillRef idx="0">
+            <a:schemeClr val="accent1"/>
+          </a:fillRef>
+          <a:effectRef idx="1">
+            <a:schemeClr val="accent1"/>
+          </a:effectRef>
+          <a:fontRef idx="minor">
+            <a:schemeClr val="tx1"/>
+          </a:fontRef>
+        </p:style>
+      </p:cxnSp>
+      <p:cxnSp>
+        <p:nvCxnSpPr>
+          <p:cNvPr id="8" name="Straight Connector 7"/>
+          <p:cNvCxnSpPr/>
+          <p:nvPr/>
+        </p:nvCxnSpPr>
+        <p:spPr>
+          <a:xfrm flipV="1">
+            <a:off x="1367228" y="1767671"/>
+            <a:ext cx="6515899" cy="1"/>
+          </a:xfrm>
+          <a:prstGeom prst="line">
+            <a:avLst/>
+          </a:prstGeom>
+          <a:ln w="28575" cmpd="sng">
+            <a:solidFill>
+              <a:schemeClr val="tx1"/>
+            </a:solidFill>
+          </a:ln>
+          <a:effectLst/>
+        </p:spPr>
+        <p:style>
+          <a:lnRef idx="2">
+            <a:schemeClr val="accent1"/>
+          </a:lnRef>
+          <a:fillRef idx="0">
+            <a:schemeClr val="accent1"/>
+          </a:fillRef>
+          <a:effectRef idx="1">
+            <a:schemeClr val="accent1"/>
+          </a:effectRef>
+          <a:fontRef idx="minor">
+            <a:schemeClr val="tx1"/>
+          </a:fontRef>
+        </p:style>
+      </p:cxnSp>
+      <p:cxnSp>
+        <p:nvCxnSpPr>
+          <p:cNvPr id="10" name="Straight Connector 9"/>
+          <p:cNvCxnSpPr/>
+          <p:nvPr/>
+        </p:nvCxnSpPr>
+        <p:spPr>
+          <a:xfrm flipV="1">
+            <a:off x="1615170" y="1532974"/>
+            <a:ext cx="469365" cy="234697"/>
+          </a:xfrm>
+          <a:prstGeom prst="line">
+            <a:avLst/>
+          </a:prstGeom>
+          <a:ln w="28575" cmpd="sng">
+            <a:solidFill>
+              <a:schemeClr val="tx1"/>
+            </a:solidFill>
+          </a:ln>
+          <a:effectLst/>
+        </p:spPr>
+        <p:style>
+          <a:lnRef idx="2">
+            <a:schemeClr val="accent1"/>
+          </a:lnRef>
+          <a:fillRef idx="0">
+            <a:schemeClr val="accent1"/>
+          </a:fillRef>
+          <a:effectRef idx="1">
+            <a:schemeClr val="accent1"/>
+          </a:effectRef>
+          <a:fontRef idx="minor">
+            <a:schemeClr val="tx1"/>
+          </a:fontRef>
+        </p:style>
+      </p:cxnSp>
+      <p:cxnSp>
+        <p:nvCxnSpPr>
+          <p:cNvPr id="11" name="Straight Connector 10"/>
+          <p:cNvCxnSpPr/>
+          <p:nvPr/>
+        </p:nvCxnSpPr>
+        <p:spPr>
+          <a:xfrm flipV="1">
+            <a:off x="2307052" y="1532974"/>
+            <a:ext cx="469365" cy="234697"/>
+          </a:xfrm>
+          <a:prstGeom prst="line">
+            <a:avLst/>
+          </a:prstGeom>
+          <a:ln w="28575" cmpd="sng">
+            <a:solidFill>
+              <a:schemeClr val="tx1"/>
+            </a:solidFill>
+          </a:ln>
+          <a:effectLst/>
+        </p:spPr>
+        <p:style>
+          <a:lnRef idx="2">
+            <a:schemeClr val="accent1"/>
+          </a:lnRef>
+          <a:fillRef idx="0">
+            <a:schemeClr val="accent1"/>
+          </a:fillRef>
+          <a:effectRef idx="1">
+            <a:schemeClr val="accent1"/>
+          </a:effectRef>
+          <a:fontRef idx="minor">
+            <a:schemeClr val="tx1"/>
+          </a:fontRef>
+        </p:style>
+      </p:cxnSp>
+      <p:cxnSp>
+        <p:nvCxnSpPr>
+          <p:cNvPr id="12" name="Straight Connector 11"/>
+          <p:cNvCxnSpPr/>
+          <p:nvPr/>
+        </p:nvCxnSpPr>
+        <p:spPr>
+          <a:xfrm flipV="1">
+            <a:off x="2969140" y="1536732"/>
+            <a:ext cx="469365" cy="234697"/>
+          </a:xfrm>
+          <a:prstGeom prst="line">
+            <a:avLst/>
+          </a:prstGeom>
+          <a:ln w="28575" cmpd="sng">
+            <a:solidFill>
+              <a:schemeClr val="tx1"/>
+            </a:solidFill>
+          </a:ln>
+          <a:effectLst/>
+        </p:spPr>
+        <p:style>
+          <a:lnRef idx="2">
+            <a:schemeClr val="accent1"/>
+          </a:lnRef>
+          <a:fillRef idx="0">
+            <a:schemeClr val="accent1"/>
+          </a:fillRef>
+          <a:effectRef idx="1">
+            <a:schemeClr val="accent1"/>
+          </a:effectRef>
+          <a:fontRef idx="minor">
+            <a:schemeClr val="tx1"/>
+          </a:fontRef>
+        </p:style>
+      </p:cxnSp>
+      <p:cxnSp>
+        <p:nvCxnSpPr>
+          <p:cNvPr id="13" name="Straight Connector 12"/>
+          <p:cNvCxnSpPr/>
+          <p:nvPr/>
+        </p:nvCxnSpPr>
+        <p:spPr>
+          <a:xfrm flipV="1">
+            <a:off x="3687539" y="1532974"/>
+            <a:ext cx="469365" cy="234697"/>
+          </a:xfrm>
+          <a:prstGeom prst="line">
+            <a:avLst/>
+          </a:prstGeom>
+          <a:ln w="28575" cmpd="sng">
+            <a:solidFill>
+              <a:schemeClr val="tx1"/>
+            </a:solidFill>
+          </a:ln>
+          <a:effectLst/>
+        </p:spPr>
+        <p:style>
+          <a:lnRef idx="2">
+            <a:schemeClr val="accent1"/>
+          </a:lnRef>
+          <a:fillRef idx="0">
+            <a:schemeClr val="accent1"/>
+          </a:fillRef>
+          <a:effectRef idx="1">
+            <a:schemeClr val="accent1"/>
+          </a:effectRef>
+          <a:fontRef idx="minor">
+            <a:schemeClr val="tx1"/>
+          </a:fontRef>
+        </p:style>
+      </p:cxnSp>
+      <p:cxnSp>
+        <p:nvCxnSpPr>
+          <p:cNvPr id="14" name="Straight Connector 13"/>
+          <p:cNvCxnSpPr/>
+          <p:nvPr/>
+        </p:nvCxnSpPr>
+        <p:spPr>
+          <a:xfrm flipV="1">
+            <a:off x="4405939" y="1536732"/>
+            <a:ext cx="469365" cy="234697"/>
+          </a:xfrm>
+          <a:prstGeom prst="line">
+            <a:avLst/>
+          </a:prstGeom>
+          <a:ln w="28575" cmpd="sng">
+            <a:solidFill>
+              <a:schemeClr val="tx1"/>
+            </a:solidFill>
+          </a:ln>
+          <a:effectLst/>
+        </p:spPr>
+        <p:style>
+          <a:lnRef idx="2">
+            <a:schemeClr val="accent1"/>
+          </a:lnRef>
+          <a:fillRef idx="0">
+            <a:schemeClr val="accent1"/>
+          </a:fillRef>
+          <a:effectRef idx="1">
+            <a:schemeClr val="accent1"/>
+          </a:effectRef>
+          <a:fontRef idx="minor">
+            <a:schemeClr val="tx1"/>
+          </a:fontRef>
+        </p:style>
+      </p:cxnSp>
+      <p:cxnSp>
+        <p:nvCxnSpPr>
+          <p:cNvPr id="15" name="Straight Connector 14"/>
+          <p:cNvCxnSpPr/>
+          <p:nvPr/>
+        </p:nvCxnSpPr>
+        <p:spPr>
+          <a:xfrm flipV="1">
+            <a:off x="7235391" y="1536732"/>
+            <a:ext cx="469365" cy="234697"/>
+          </a:xfrm>
+          <a:prstGeom prst="line">
+            <a:avLst/>
+          </a:prstGeom>
+          <a:ln w="28575" cmpd="sng">
+            <a:solidFill>
+              <a:schemeClr val="tx1"/>
+            </a:solidFill>
+          </a:ln>
+          <a:effectLst/>
+        </p:spPr>
+        <p:style>
+          <a:lnRef idx="2">
+            <a:schemeClr val="accent1"/>
+          </a:lnRef>
+          <a:fillRef idx="0">
+            <a:schemeClr val="accent1"/>
+          </a:fillRef>
+          <a:effectRef idx="1">
+            <a:schemeClr val="accent1"/>
+          </a:effectRef>
+          <a:fontRef idx="minor">
+            <a:schemeClr val="tx1"/>
+          </a:fontRef>
+        </p:style>
+      </p:cxnSp>
+      <p:cxnSp>
+        <p:nvCxnSpPr>
+          <p:cNvPr id="16" name="Straight Connector 15"/>
+          <p:cNvCxnSpPr/>
+          <p:nvPr/>
+        </p:nvCxnSpPr>
+        <p:spPr>
+          <a:xfrm flipV="1">
+            <a:off x="5122153" y="1536732"/>
+            <a:ext cx="469365" cy="234697"/>
+          </a:xfrm>
+          <a:prstGeom prst="line">
+            <a:avLst/>
+          </a:prstGeom>
+          <a:ln w="28575" cmpd="sng">
+            <a:solidFill>
+              <a:schemeClr val="tx1"/>
+            </a:solidFill>
+          </a:ln>
+          <a:effectLst/>
+        </p:spPr>
+        <p:style>
+          <a:lnRef idx="2">
+            <a:schemeClr val="accent1"/>
+          </a:lnRef>
+          <a:fillRef idx="0">
+            <a:schemeClr val="accent1"/>
+          </a:fillRef>
+          <a:effectRef idx="1">
+            <a:schemeClr val="accent1"/>
+          </a:effectRef>
+          <a:fontRef idx="minor">
+            <a:schemeClr val="tx1"/>
+          </a:fontRef>
+        </p:style>
+      </p:cxnSp>
+      <p:cxnSp>
+        <p:nvCxnSpPr>
+          <p:cNvPr id="17" name="Straight Connector 16"/>
+          <p:cNvCxnSpPr/>
+          <p:nvPr/>
+        </p:nvCxnSpPr>
+        <p:spPr>
+          <a:xfrm flipV="1">
+            <a:off x="5840552" y="1532975"/>
+            <a:ext cx="469365" cy="234697"/>
+          </a:xfrm>
+          <a:prstGeom prst="line">
+            <a:avLst/>
+          </a:prstGeom>
+          <a:ln w="28575" cmpd="sng">
+            <a:solidFill>
+              <a:schemeClr val="tx1"/>
+            </a:solidFill>
+          </a:ln>
+          <a:effectLst/>
+        </p:spPr>
+        <p:style>
+          <a:lnRef idx="2">
+            <a:schemeClr val="accent1"/>
+          </a:lnRef>
+          <a:fillRef idx="0">
+            <a:schemeClr val="accent1"/>
+          </a:fillRef>
+          <a:effectRef idx="1">
+            <a:schemeClr val="accent1"/>
+          </a:effectRef>
+          <a:fontRef idx="minor">
+            <a:schemeClr val="tx1"/>
+          </a:fontRef>
+        </p:style>
+      </p:cxnSp>
+      <p:cxnSp>
+        <p:nvCxnSpPr>
+          <p:cNvPr id="18" name="Straight Connector 17"/>
+          <p:cNvCxnSpPr/>
+          <p:nvPr/>
+        </p:nvCxnSpPr>
+        <p:spPr>
+          <a:xfrm flipV="1">
+            <a:off x="6530250" y="1532975"/>
+            <a:ext cx="469365" cy="234697"/>
+          </a:xfrm>
+          <a:prstGeom prst="line">
+            <a:avLst/>
+          </a:prstGeom>
+          <a:ln w="28575" cmpd="sng">
+            <a:solidFill>
+              <a:schemeClr val="tx1"/>
+            </a:solidFill>
+          </a:ln>
+          <a:effectLst/>
+        </p:spPr>
+        <p:style>
+          <a:lnRef idx="2">
+            <a:schemeClr val="accent1"/>
+          </a:lnRef>
+          <a:fillRef idx="0">
+            <a:schemeClr val="accent1"/>
+          </a:fillRef>
+          <a:effectRef idx="1">
+            <a:schemeClr val="accent1"/>
+          </a:effectRef>
+          <a:fontRef idx="minor">
+            <a:schemeClr val="tx1"/>
+          </a:fontRef>
+        </p:style>
+      </p:cxnSp>
+      <p:sp>
+        <p:nvSpPr>
+          <p:cNvPr id="19" name="Oval 18"/>
+          <p:cNvSpPr/>
+          <p:nvPr/>
+        </p:nvSpPr>
+        <p:spPr>
+          <a:xfrm>
+            <a:off x="3286651" y="2204917"/>
+            <a:ext cx="303707" cy="317532"/>
+          </a:xfrm>
+          <a:prstGeom prst="ellipse">
+            <a:avLst/>
+          </a:prstGeom>
+          <a:solidFill>
+            <a:schemeClr val="accent6"/>
+          </a:solidFill>
+          <a:ln>
+            <a:solidFill>
+              <a:schemeClr val="accent6"/>
+            </a:solidFill>
+          </a:ln>
+          <a:effectLst/>
+        </p:spPr>
+        <p:style>
+          <a:lnRef idx="1">
+            <a:schemeClr val="accent1"/>
+          </a:lnRef>
+          <a:fillRef idx="3">
+            <a:schemeClr val="accent1"/>
+          </a:fillRef>
+          <a:effectRef idx="2">
+            <a:schemeClr val="accent1"/>
+          </a:effectRef>
+          <a:fontRef idx="minor">
+            <a:schemeClr val="lt1"/>
+          </a:fontRef>
+        </p:style>
+        <p:txBody>
+          <a:bodyPr rtlCol="0" anchor="ctr"/>
+          <a:lstStyle/>
+          <a:p>
+            <a:pPr algn="ctr"/>
+            <a:endParaRPr lang="en-GB"/>
+          </a:p>
+        </p:txBody>
+      </p:sp>
+      <p:sp>
+        <p:nvSpPr>
+          <p:cNvPr id="26" name="Oval 25"/>
+          <p:cNvSpPr/>
+          <p:nvPr/>
+        </p:nvSpPr>
+        <p:spPr>
+          <a:xfrm>
+            <a:off x="2553901" y="1671568"/>
+            <a:ext cx="1008847" cy="109908"/>
+          </a:xfrm>
+          <a:prstGeom prst="ellipse">
+            <a:avLst/>
+          </a:prstGeom>
+          <a:solidFill>
+            <a:srgbClr val="3366FF"/>
+          </a:solidFill>
+          <a:ln>
+            <a:solidFill>
+              <a:srgbClr val="3366FF"/>
+            </a:solidFill>
+          </a:ln>
+          <a:effectLst/>
+        </p:spPr>
+        <p:style>
+          <a:lnRef idx="1">
+            <a:schemeClr val="accent1"/>
+          </a:lnRef>
+          <a:fillRef idx="3">
+            <a:schemeClr val="accent1"/>
+          </a:fillRef>
+          <a:effectRef idx="2">
+            <a:schemeClr val="accent1"/>
+          </a:effectRef>
+          <a:fontRef idx="minor">
+            <a:schemeClr val="lt1"/>
+          </a:fontRef>
+        </p:style>
+        <p:txBody>
+          <a:bodyPr rtlCol="0" anchor="ctr"/>
+          <a:lstStyle/>
+          <a:p>
+            <a:pPr algn="ctr"/>
+            <a:endParaRPr lang="en-GB"/>
+          </a:p>
+        </p:txBody>
+      </p:sp>
+      <p:sp>
+        <p:nvSpPr>
+          <p:cNvPr id="32" name="Oval 31"/>
+          <p:cNvSpPr/>
+          <p:nvPr/>
+        </p:nvSpPr>
+        <p:spPr>
+          <a:xfrm>
+            <a:off x="4970299" y="5446363"/>
+            <a:ext cx="303707" cy="317532"/>
+          </a:xfrm>
+          <a:prstGeom prst="ellipse">
+            <a:avLst/>
+          </a:prstGeom>
+          <a:solidFill>
+            <a:schemeClr val="accent3">
+              <a:lumMod val="75000"/>
+            </a:schemeClr>
+          </a:solidFill>
+          <a:ln>
+            <a:solidFill>
+              <a:schemeClr val="accent3">
+                <a:lumMod val="75000"/>
+              </a:schemeClr>
+            </a:solidFill>
+          </a:ln>
+          <a:effectLst/>
+        </p:spPr>
+        <p:style>
+          <a:lnRef idx="1">
+            <a:schemeClr val="accent1"/>
+          </a:lnRef>
+          <a:fillRef idx="3">
+            <a:schemeClr val="accent1"/>
+          </a:fillRef>
+          <a:effectRef idx="2">
+            <a:schemeClr val="accent1"/>
+          </a:effectRef>
+          <a:fontRef idx="minor">
+            <a:schemeClr val="lt1"/>
+          </a:fontRef>
+        </p:style>
+        <p:txBody>
+          <a:bodyPr rtlCol="0" anchor="ctr"/>
+          <a:lstStyle/>
+          <a:p>
+            <a:pPr algn="ctr"/>
+            <a:endParaRPr lang="en-GB"/>
+          </a:p>
+        </p:txBody>
+      </p:sp>
+      <p:sp>
+        <p:nvSpPr>
+          <p:cNvPr id="33" name="TextBox 32"/>
+          <p:cNvSpPr txBox="1"/>
+          <p:nvPr/>
+        </p:nvSpPr>
+        <p:spPr>
+          <a:xfrm>
+            <a:off x="3605802" y="2263402"/>
+            <a:ext cx="2649442" cy="461665"/>
+          </a:xfrm>
+          <a:prstGeom prst="rect">
+            <a:avLst/>
+          </a:prstGeom>
+          <a:noFill/>
+        </p:spPr>
+        <p:txBody>
+          <a:bodyPr wrap="square" rtlCol="0">
+            <a:spAutoFit/>
+          </a:bodyPr>
+          <a:lstStyle/>
+          <a:p>
+            <a:r>
+              <a:rPr lang="en-GB" sz="2400" dirty="0" smtClean="0"/>
+              <a:t>Conversion vertex</a:t>
+            </a:r>
+            <a:endParaRPr lang="en-GB" sz="2400" dirty="0"/>
+          </a:p>
+        </p:txBody>
+      </p:sp>
+      <p:sp>
+        <p:nvSpPr>
+          <p:cNvPr id="34" name="TextBox 33"/>
+          <p:cNvSpPr txBox="1"/>
+          <p:nvPr/>
+        </p:nvSpPr>
+        <p:spPr>
+          <a:xfrm>
+            <a:off x="1755129" y="1075067"/>
+            <a:ext cx="3007823" cy="461665"/>
+          </a:xfrm>
+          <a:prstGeom prst="rect">
+            <a:avLst/>
+          </a:prstGeom>
+          <a:noFill/>
+        </p:spPr>
+        <p:txBody>
+          <a:bodyPr wrap="square" rtlCol="0">
+            <a:spAutoFit/>
+          </a:bodyPr>
+          <a:lstStyle/>
+          <a:p>
+            <a:pPr algn="ctr"/>
+            <a:r>
+              <a:rPr lang="en-GB" sz="2400" dirty="0" err="1" smtClean="0"/>
+              <a:t>Supercluster</a:t>
+            </a:r>
+            <a:r>
+              <a:rPr lang="en-GB" sz="2400" dirty="0" smtClean="0"/>
+              <a:t> position</a:t>
+            </a:r>
+            <a:endParaRPr lang="en-GB" sz="2400" dirty="0"/>
+          </a:p>
+        </p:txBody>
+      </p:sp>
+      <p:sp>
+        <p:nvSpPr>
+          <p:cNvPr id="35" name="TextBox 34"/>
+          <p:cNvSpPr txBox="1"/>
+          <p:nvPr/>
+        </p:nvSpPr>
+        <p:spPr>
+          <a:xfrm>
+            <a:off x="5122153" y="1725010"/>
+            <a:ext cx="1763745" cy="461665"/>
+          </a:xfrm>
+          <a:prstGeom prst="rect">
+            <a:avLst/>
+          </a:prstGeom>
+          <a:noFill/>
+        </p:spPr>
+        <p:txBody>
+          <a:bodyPr wrap="square" rtlCol="0">
+            <a:spAutoFit/>
+          </a:bodyPr>
+          <a:lstStyle/>
+          <a:p>
+            <a:pPr algn="ctr"/>
+            <a:r>
+              <a:rPr lang="en-GB" sz="2400" dirty="0" smtClean="0"/>
+              <a:t>ECAL face</a:t>
+            </a:r>
+            <a:endParaRPr lang="en-GB" sz="2400" dirty="0"/>
+          </a:p>
+        </p:txBody>
+      </p:sp>
+      <p:sp>
+        <p:nvSpPr>
+          <p:cNvPr id="40" name="Oval 39"/>
+          <p:cNvSpPr/>
+          <p:nvPr/>
+        </p:nvSpPr>
+        <p:spPr>
+          <a:xfrm>
+            <a:off x="3038165" y="1698640"/>
+            <a:ext cx="152400" cy="172571"/>
+          </a:xfrm>
+          <a:prstGeom prst="ellipse">
+            <a:avLst/>
+          </a:prstGeom>
+          <a:solidFill>
+            <a:schemeClr val="tx1"/>
+          </a:solidFill>
+          <a:ln>
+            <a:solidFill>
+              <a:schemeClr val="tx1"/>
+            </a:solidFill>
+          </a:ln>
+          <a:effectLst/>
+        </p:spPr>
+        <p:style>
+          <a:lnRef idx="1">
+            <a:schemeClr val="accent1"/>
+          </a:lnRef>
+          <a:fillRef idx="3">
+            <a:schemeClr val="accent1"/>
+          </a:fillRef>
+          <a:effectRef idx="2">
+            <a:schemeClr val="accent1"/>
+          </a:effectRef>
+          <a:fontRef idx="minor">
+            <a:schemeClr val="lt1"/>
+          </a:fontRef>
+        </p:style>
+        <p:txBody>
+          <a:bodyPr rtlCol="0" anchor="ctr"/>
+          <a:lstStyle/>
+          <a:p>
+            <a:pPr algn="ctr"/>
+            <a:endParaRPr lang="en-GB"/>
+          </a:p>
+        </p:txBody>
+      </p:sp>
+      <p:sp>
+        <p:nvSpPr>
+          <p:cNvPr id="36" name="TextBox 35"/>
+          <p:cNvSpPr txBox="1"/>
+          <p:nvPr/>
+        </p:nvSpPr>
+        <p:spPr>
+          <a:xfrm>
+            <a:off x="1009941" y="2181565"/>
+            <a:ext cx="2042029" cy="461665"/>
+          </a:xfrm>
+          <a:prstGeom prst="rect">
+            <a:avLst/>
+          </a:prstGeom>
+          <a:noFill/>
+        </p:spPr>
+        <p:txBody>
+          <a:bodyPr wrap="square" rtlCol="0">
+            <a:spAutoFit/>
+          </a:bodyPr>
+          <a:lstStyle/>
+          <a:p>
+            <a:pPr algn="ctr"/>
+            <a:r>
+              <a:rPr lang="en-GB" sz="2400" dirty="0" smtClean="0"/>
+              <a:t>Electron tracks</a:t>
+            </a:r>
+            <a:endParaRPr lang="en-GB" sz="2400" dirty="0"/>
+          </a:p>
+        </p:txBody>
+      </p:sp>
+      <p:sp>
+        <p:nvSpPr>
+          <p:cNvPr id="38" name="TextBox 37"/>
+          <p:cNvSpPr txBox="1"/>
+          <p:nvPr/>
+        </p:nvSpPr>
+        <p:spPr>
+          <a:xfrm>
+            <a:off x="1343989" y="5143465"/>
+            <a:ext cx="1763745" cy="461665"/>
+          </a:xfrm>
+          <a:prstGeom prst="rect">
+            <a:avLst/>
+          </a:prstGeom>
+          <a:noFill/>
+        </p:spPr>
+        <p:txBody>
+          <a:bodyPr wrap="square" rtlCol="0">
+            <a:spAutoFit/>
+          </a:bodyPr>
+          <a:lstStyle/>
+          <a:p>
+            <a:pPr algn="ctr"/>
+            <a:r>
+              <a:rPr lang="en-GB" sz="2400" dirty="0" err="1" smtClean="0"/>
+              <a:t>Beamline</a:t>
+            </a:r>
+            <a:endParaRPr lang="en-GB" sz="2400" dirty="0"/>
+          </a:p>
+        </p:txBody>
+      </p:sp>
+      <p:sp>
+        <p:nvSpPr>
+          <p:cNvPr id="39" name="TextBox 38"/>
+          <p:cNvSpPr txBox="1"/>
+          <p:nvPr/>
+        </p:nvSpPr>
+        <p:spPr>
+          <a:xfrm>
+            <a:off x="5233685" y="4774132"/>
+            <a:ext cx="2471071" cy="830997"/>
+          </a:xfrm>
+          <a:prstGeom prst="rect">
+            <a:avLst/>
+          </a:prstGeom>
+          <a:noFill/>
+        </p:spPr>
+        <p:txBody>
+          <a:bodyPr wrap="square" rtlCol="0">
+            <a:spAutoFit/>
+          </a:bodyPr>
+          <a:lstStyle/>
+          <a:p>
+            <a:r>
+              <a:rPr lang="en-GB" sz="2400" dirty="0" smtClean="0"/>
+              <a:t>Estimated vertex position</a:t>
+            </a:r>
+            <a:endParaRPr lang="en-GB" sz="2400" dirty="0"/>
+          </a:p>
+        </p:txBody>
+      </p:sp>
+      <p:cxnSp>
+        <p:nvCxnSpPr>
+          <p:cNvPr id="31" name="Straight Connector 30"/>
+          <p:cNvCxnSpPr/>
+          <p:nvPr/>
+        </p:nvCxnSpPr>
+        <p:spPr>
+          <a:xfrm>
+            <a:off x="3107734" y="1781477"/>
+            <a:ext cx="2014419" cy="3823653"/>
+          </a:xfrm>
+          <a:prstGeom prst="line">
+            <a:avLst/>
+          </a:prstGeom>
+          <a:ln w="28575" cmpd="sng">
+            <a:solidFill>
+              <a:srgbClr val="FF0000"/>
+            </a:solidFill>
+            <a:prstDash val="sysDash"/>
+          </a:ln>
+          <a:effectLst/>
+        </p:spPr>
+        <p:style>
+          <a:lnRef idx="2">
+            <a:schemeClr val="accent1"/>
+          </a:lnRef>
+          <a:fillRef idx="0">
+            <a:schemeClr val="accent1"/>
+          </a:fillRef>
+          <a:effectRef idx="1">
+            <a:schemeClr val="accent1"/>
+          </a:effectRef>
+          <a:fontRef idx="minor">
+            <a:schemeClr val="tx1"/>
+          </a:fontRef>
+        </p:style>
+      </p:cxnSp>
+      <p:cxnSp>
+        <p:nvCxnSpPr>
+          <p:cNvPr id="9" name="Straight Connector 8"/>
+          <p:cNvCxnSpPr/>
+          <p:nvPr/>
+        </p:nvCxnSpPr>
+        <p:spPr>
+          <a:xfrm flipV="1">
+            <a:off x="3438505" y="1781477"/>
+            <a:ext cx="0" cy="616656"/>
+          </a:xfrm>
+          <a:prstGeom prst="line">
+            <a:avLst/>
+          </a:prstGeom>
+          <a:ln w="28575" cmpd="sng">
+            <a:solidFill>
+              <a:schemeClr val="tx1"/>
+            </a:solidFill>
+          </a:ln>
+          <a:effectLst/>
+        </p:spPr>
+        <p:style>
+          <a:lnRef idx="2">
+            <a:schemeClr val="accent1"/>
+          </a:lnRef>
+          <a:fillRef idx="0">
+            <a:schemeClr val="accent1"/>
+          </a:fillRef>
+          <a:effectRef idx="1">
+            <a:schemeClr val="accent1"/>
+          </a:effectRef>
+          <a:fontRef idx="minor">
+            <a:schemeClr val="tx1"/>
+          </a:fontRef>
+        </p:style>
+      </p:cxnSp>
+      <p:cxnSp>
+        <p:nvCxnSpPr>
+          <p:cNvPr id="41" name="Straight Connector 40"/>
+          <p:cNvCxnSpPr/>
+          <p:nvPr/>
+        </p:nvCxnSpPr>
+        <p:spPr>
+          <a:xfrm flipH="1" flipV="1">
+            <a:off x="2664340" y="1781476"/>
+            <a:ext cx="774165" cy="616657"/>
+          </a:xfrm>
+          <a:prstGeom prst="line">
+            <a:avLst/>
+          </a:prstGeom>
+          <a:ln w="28575" cmpd="sng">
+            <a:solidFill>
+              <a:schemeClr val="tx1"/>
+            </a:solidFill>
+          </a:ln>
+          <a:effectLst/>
+        </p:spPr>
+        <p:style>
+          <a:lnRef idx="2">
+            <a:schemeClr val="accent1"/>
+          </a:lnRef>
+          <a:fillRef idx="0">
+            <a:schemeClr val="accent1"/>
+          </a:fillRef>
+          <a:effectRef idx="1">
+            <a:schemeClr val="accent1"/>
+          </a:effectRef>
+          <a:fontRef idx="minor">
+            <a:schemeClr val="tx1"/>
+          </a:fontRef>
+        </p:style>
+      </p:cxnSp>
+      <p:cxnSp>
+        <p:nvCxnSpPr>
+          <p:cNvPr id="3" name="Straight Arrow Connector 2"/>
+          <p:cNvCxnSpPr/>
+          <p:nvPr/>
+        </p:nvCxnSpPr>
+        <p:spPr>
+          <a:xfrm>
+            <a:off x="1214828" y="6046913"/>
+            <a:ext cx="1092224" cy="0"/>
+          </a:xfrm>
+          <a:prstGeom prst="straightConnector1">
+            <a:avLst/>
+          </a:prstGeom>
+          <a:ln w="28575" cmpd="sng">
+            <a:solidFill>
+              <a:schemeClr val="tx1"/>
+            </a:solidFill>
+            <a:tailEnd type="arrow"/>
+          </a:ln>
+          <a:effectLst/>
+        </p:spPr>
+        <p:style>
+          <a:lnRef idx="2">
+            <a:schemeClr val="accent1"/>
+          </a:lnRef>
+          <a:fillRef idx="0">
+            <a:schemeClr val="accent1"/>
+          </a:fillRef>
+          <a:effectRef idx="1">
+            <a:schemeClr val="accent1"/>
+          </a:effectRef>
+          <a:fontRef idx="minor">
+            <a:schemeClr val="tx1"/>
+          </a:fontRef>
+        </p:style>
+      </p:cxnSp>
+      <p:sp>
+        <p:nvSpPr>
           <p:cNvPr id="29" name="TextBox 28"/>
           <p:cNvSpPr txBox="1"/>
           <p:nvPr/>
@@ -4082,10 +5422,283 @@
           </a:p>
         </p:txBody>
       </p:sp>
+      <p:sp>
+        <p:nvSpPr>
+          <p:cNvPr id="30" name="TextBox 29"/>
+          <p:cNvSpPr txBox="1"/>
+          <p:nvPr/>
+        </p:nvSpPr>
+        <p:spPr>
+          <a:xfrm>
+            <a:off x="3510261" y="1771429"/>
+            <a:ext cx="1791356" cy="523220"/>
+          </a:xfrm>
+          <a:prstGeom prst="rect">
+            <a:avLst/>
+          </a:prstGeom>
+          <a:noFill/>
+        </p:spPr>
+        <p:txBody>
+          <a:bodyPr wrap="square" rtlCol="0">
+            <a:spAutoFit/>
+          </a:bodyPr>
+          <a:lstStyle/>
+          <a:p>
+            <a:r>
+              <a:rPr lang="en-GB" sz="1400" dirty="0" smtClean="0"/>
+              <a:t>Electrons separate in </a:t>
+            </a:r>
+            <a:r>
+              <a:rPr lang="en-GB" sz="1400" i="1" dirty="0" err="1" smtClean="0"/>
+              <a:t>ϕ</a:t>
+            </a:r>
+            <a:r>
+              <a:rPr lang="en-GB" sz="1400" dirty="0" smtClean="0"/>
+              <a:t> only to first order</a:t>
+            </a:r>
+            <a:endParaRPr lang="en-GB" sz="1400" dirty="0"/>
+          </a:p>
+        </p:txBody>
+      </p:sp>
+      <p:sp>
+        <p:nvSpPr>
+          <p:cNvPr id="2" name="Freeform 1"/>
+          <p:cNvSpPr/>
+          <p:nvPr/>
+        </p:nvSpPr>
+        <p:spPr>
+          <a:xfrm>
+            <a:off x="3086100" y="1941058"/>
+            <a:ext cx="347133" cy="167142"/>
+          </a:xfrm>
+          <a:custGeom>
+            <a:avLst/>
+            <a:gdLst>
+              <a:gd name="connsiteX0" fmla="*/ 0 w 347133"/>
+              <a:gd name="connsiteY0" fmla="*/ 167142 h 167142"/>
+              <a:gd name="connsiteX1" fmla="*/ 118533 w 347133"/>
+              <a:gd name="connsiteY1" fmla="*/ 23209 h 167142"/>
+              <a:gd name="connsiteX2" fmla="*/ 347133 w 347133"/>
+              <a:gd name="connsiteY2" fmla="*/ 2042 h 167142"/>
+            </a:gdLst>
+            <a:ahLst/>
+            <a:cxnLst>
+              <a:cxn ang="0">
+                <a:pos x="connsiteX0" y="connsiteY0"/>
+              </a:cxn>
+              <a:cxn ang="0">
+                <a:pos x="connsiteX1" y="connsiteY1"/>
+              </a:cxn>
+              <a:cxn ang="0">
+                <a:pos x="connsiteX2" y="connsiteY2"/>
+              </a:cxn>
+            </a:cxnLst>
+            <a:rect l="l" t="t" r="r" b="b"/>
+            <a:pathLst>
+              <a:path w="347133" h="167142">
+                <a:moveTo>
+                  <a:pt x="0" y="167142"/>
+                </a:moveTo>
+                <a:cubicBezTo>
+                  <a:pt x="30339" y="108934"/>
+                  <a:pt x="60678" y="50726"/>
+                  <a:pt x="118533" y="23209"/>
+                </a:cubicBezTo>
+                <a:cubicBezTo>
+                  <a:pt x="176388" y="-4308"/>
+                  <a:pt x="261760" y="-1133"/>
+                  <a:pt x="347133" y="2042"/>
+                </a:cubicBezTo>
+              </a:path>
+            </a:pathLst>
+          </a:custGeom>
+          <a:ln>
+            <a:solidFill>
+              <a:srgbClr val="000000"/>
+            </a:solidFill>
+          </a:ln>
+          <a:effectLst/>
+        </p:spPr>
+        <p:style>
+          <a:lnRef idx="2">
+            <a:schemeClr val="accent1"/>
+          </a:lnRef>
+          <a:fillRef idx="0">
+            <a:schemeClr val="accent1"/>
+          </a:fillRef>
+          <a:effectRef idx="1">
+            <a:schemeClr val="accent1"/>
+          </a:effectRef>
+          <a:fontRef idx="minor">
+            <a:schemeClr val="tx1"/>
+          </a:fontRef>
+        </p:style>
+        <p:txBody>
+          <a:bodyPr rtlCol="0" anchor="ctr"/>
+          <a:lstStyle/>
+          <a:p>
+            <a:pPr algn="ctr"/>
+            <a:endParaRPr lang="en-GB">
+              <a:solidFill>
+                <a:srgbClr val="000000"/>
+              </a:solidFill>
+            </a:endParaRPr>
+          </a:p>
+        </p:txBody>
+      </p:sp>
+      <p:grpSp>
+        <p:nvGrpSpPr>
+          <p:cNvPr id="37" name="Group 36"/>
+          <p:cNvGrpSpPr/>
+          <p:nvPr/>
+        </p:nvGrpSpPr>
+        <p:grpSpPr>
+          <a:xfrm>
+            <a:off x="1214828" y="3925393"/>
+            <a:ext cx="1131082" cy="839641"/>
+            <a:chOff x="1214828" y="3925393"/>
+            <a:chExt cx="1131082" cy="839641"/>
+          </a:xfrm>
+        </p:grpSpPr>
+        <p:cxnSp>
+          <p:nvCxnSpPr>
+            <p:cNvPr id="42" name="Straight Arrow Connector 41"/>
+            <p:cNvCxnSpPr/>
+            <p:nvPr/>
+          </p:nvCxnSpPr>
+          <p:spPr>
+            <a:xfrm>
+              <a:off x="1214828" y="4576535"/>
+              <a:ext cx="704049" cy="0"/>
+            </a:xfrm>
+            <a:prstGeom prst="straightConnector1">
+              <a:avLst/>
+            </a:prstGeom>
+            <a:ln w="28575" cmpd="sng">
+              <a:solidFill>
+                <a:schemeClr val="tx1"/>
+              </a:solidFill>
+              <a:tailEnd type="arrow"/>
+            </a:ln>
+            <a:effectLst/>
+          </p:spPr>
+          <p:style>
+            <a:lnRef idx="2">
+              <a:schemeClr val="accent1"/>
+            </a:lnRef>
+            <a:fillRef idx="0">
+              <a:schemeClr val="accent1"/>
+            </a:fillRef>
+            <a:effectRef idx="1">
+              <a:schemeClr val="accent1"/>
+            </a:effectRef>
+            <a:fontRef idx="minor">
+              <a:schemeClr val="tx1"/>
+            </a:fontRef>
+          </p:style>
+        </p:cxnSp>
+        <p:cxnSp>
+          <p:nvCxnSpPr>
+            <p:cNvPr id="43" name="Straight Arrow Connector 42"/>
+            <p:cNvCxnSpPr/>
+            <p:nvPr/>
+          </p:nvCxnSpPr>
+          <p:spPr>
+            <a:xfrm flipV="1">
+              <a:off x="1214828" y="4289778"/>
+              <a:ext cx="540301" cy="286757"/>
+            </a:xfrm>
+            <a:prstGeom prst="straightConnector1">
+              <a:avLst/>
+            </a:prstGeom>
+            <a:ln w="28575" cmpd="sng">
+              <a:solidFill>
+                <a:schemeClr val="tx1"/>
+              </a:solidFill>
+              <a:tailEnd type="arrow"/>
+            </a:ln>
+            <a:effectLst/>
+          </p:spPr>
+          <p:style>
+            <a:lnRef idx="2">
+              <a:schemeClr val="accent1"/>
+            </a:lnRef>
+            <a:fillRef idx="0">
+              <a:schemeClr val="accent1"/>
+            </a:fillRef>
+            <a:effectRef idx="1">
+              <a:schemeClr val="accent1"/>
+            </a:effectRef>
+            <a:fontRef idx="minor">
+              <a:schemeClr val="tx1"/>
+            </a:fontRef>
+          </p:style>
+        </p:cxnSp>
+        <p:sp>
+          <p:nvSpPr>
+            <p:cNvPr id="44" name="TextBox 43"/>
+            <p:cNvSpPr txBox="1"/>
+            <p:nvPr/>
+          </p:nvSpPr>
+          <p:spPr>
+            <a:xfrm>
+              <a:off x="1876544" y="4303369"/>
+              <a:ext cx="469366" cy="461665"/>
+            </a:xfrm>
+            <a:prstGeom prst="rect">
+              <a:avLst/>
+            </a:prstGeom>
+            <a:noFill/>
+          </p:spPr>
+          <p:txBody>
+            <a:bodyPr wrap="square" rtlCol="0">
+              <a:spAutoFit/>
+            </a:bodyPr>
+            <a:lstStyle/>
+            <a:p>
+              <a:r>
+                <a:rPr lang="en-GB" sz="2400" i="1" dirty="0" err="1" smtClean="0"/>
+                <a:t>η</a:t>
+              </a:r>
+              <a:endParaRPr lang="en-GB" sz="2400" i="1" dirty="0"/>
+            </a:p>
+          </p:txBody>
+        </p:sp>
+        <p:sp>
+          <p:nvSpPr>
+            <p:cNvPr id="45" name="TextBox 44"/>
+            <p:cNvSpPr txBox="1"/>
+            <p:nvPr/>
+          </p:nvSpPr>
+          <p:spPr>
+            <a:xfrm>
+              <a:off x="1684194" y="3925393"/>
+              <a:ext cx="469366" cy="461665"/>
+            </a:xfrm>
+            <a:prstGeom prst="rect">
+              <a:avLst/>
+            </a:prstGeom>
+            <a:noFill/>
+          </p:spPr>
+          <p:txBody>
+            <a:bodyPr wrap="square" rtlCol="0">
+              <a:spAutoFit/>
+            </a:bodyPr>
+            <a:lstStyle/>
+            <a:p>
+              <a:r>
+                <a:rPr lang="en-GB" sz="2400" i="1" dirty="0" err="1" smtClean="0"/>
+                <a:t>ϕ</a:t>
+              </a:r>
+              <a:endParaRPr lang="en-GB" sz="2400" i="1" dirty="0"/>
+            </a:p>
+          </p:txBody>
+        </p:sp>
+      </p:grpSp>
     </p:spTree>
     <p:extLst>
       <p:ext uri="{BB962C8B-B14F-4D97-AF65-F5344CB8AC3E}">
-        <p14:creationId xmlns:p14="http://schemas.microsoft.com/office/powerpoint/2010/main" val="1727842282"/>
+        <p14:creationId xmlns:p14="http://schemas.microsoft.com/office/powerpoint/2010/main" val="3295286209"/>
       </p:ext>
     </p:extLst>
   </p:cSld>

</xml_diff>